<commit_message>
Changed Table of Content Size
</commit_message>
<xml_diff>
--- a/documentation/required documents/Presentation/Webasierter Datenkbankmanager - Präsentation.pptx
+++ b/documentation/required documents/Presentation/Webasierter Datenkbankmanager - Präsentation.pptx
@@ -23041,7 +23041,7 @@
           </a:prstGeom>
         </p:spPr>
         <p:txBody>
-          <a:bodyPr spcFirstLastPara="1" wrap="square" lIns="91425" tIns="91425" rIns="91425" bIns="91425" anchor="ctr" anchorCtr="0">
+          <a:bodyPr spcFirstLastPara="1" wrap="square" lIns="91425" tIns="91425" rIns="91425" bIns="91425" numCol="2" anchor="ctr" anchorCtr="0">
             <a:noAutofit/>
           </a:bodyPr>
           <a:lstStyle/>
@@ -23053,11 +23053,11 @@
               <a:spcAft>
                 <a:spcPts val="0"/>
               </a:spcAft>
-              <a:buSzPts val="1000"/>
+              <a:buSzPct val="100000"/>
               <a:buAutoNum type="arabicPeriod"/>
             </a:pPr>
             <a:r>
-              <a:rPr lang="en-US" dirty="0"/>
+              <a:rPr lang="en-US" sz="2400" dirty="0"/>
               <a:t>ORGANISATION</a:t>
             </a:r>
           </a:p>
@@ -23069,14 +23069,14 @@
               <a:spcAft>
                 <a:spcPts val="0"/>
               </a:spcAft>
-              <a:buSzPts val="1000"/>
+              <a:buSzPct val="100000"/>
               <a:buAutoNum type="arabicPeriod"/>
             </a:pPr>
             <a:r>
-              <a:rPr lang="en" dirty="0"/>
+              <a:rPr lang="en" sz="2400" dirty="0"/>
               <a:t>PROJEKT ARCHITEKTUR</a:t>
             </a:r>
-            <a:endParaRPr dirty="0"/>
+            <a:endParaRPr sz="2400" dirty="0"/>
           </a:p>
           <a:p>
             <a:pPr marL="365760" lvl="0" indent="-154939" algn="l" rtl="0">
@@ -23086,14 +23086,14 @@
               <a:spcAft>
                 <a:spcPts val="0"/>
               </a:spcAft>
-              <a:buSzPts val="1000"/>
+              <a:buSzPct val="100000"/>
               <a:buAutoNum type="arabicPeriod"/>
             </a:pPr>
             <a:r>
-              <a:rPr lang="de-DE" dirty="0"/>
+              <a:rPr lang="de-DE" sz="2400" dirty="0"/>
               <a:t>DOCKER</a:t>
             </a:r>
-            <a:endParaRPr dirty="0"/>
+            <a:endParaRPr sz="2400" dirty="0"/>
           </a:p>
           <a:p>
             <a:pPr marL="365760" lvl="0" indent="-154939" algn="l" rtl="0">
@@ -23103,14 +23103,14 @@
               <a:spcAft>
                 <a:spcPts val="0"/>
               </a:spcAft>
-              <a:buSzPts val="1000"/>
+              <a:buSzPct val="100000"/>
               <a:buAutoNum type="arabicPeriod"/>
             </a:pPr>
             <a:r>
-              <a:rPr lang="de-DE" dirty="0"/>
+              <a:rPr lang="de-DE" sz="2400" dirty="0"/>
               <a:t>HTTP API</a:t>
             </a:r>
-            <a:endParaRPr dirty="0"/>
+            <a:endParaRPr sz="2400" dirty="0"/>
           </a:p>
           <a:p>
             <a:pPr marL="365760" lvl="0" indent="-154939" algn="l" rtl="0">
@@ -23120,18 +23120,18 @@
               <a:spcAft>
                 <a:spcPts val="0"/>
               </a:spcAft>
-              <a:buSzPts val="1000"/>
+              <a:buSzPct val="100000"/>
               <a:buAutoNum type="arabicPeriod"/>
             </a:pPr>
             <a:r>
-              <a:rPr lang="de-DE" dirty="0">
+              <a:rPr lang="de-DE" sz="2400" dirty="0">
                 <a:uFill>
                   <a:noFill/>
                 </a:uFill>
               </a:rPr>
               <a:t>JSON Web Token</a:t>
             </a:r>
-            <a:endParaRPr dirty="0"/>
+            <a:endParaRPr sz="2400" dirty="0"/>
           </a:p>
           <a:p>
             <a:pPr marL="365760" lvl="0" indent="-154939" algn="l" rtl="0">
@@ -23141,11 +23141,11 @@
               <a:spcAft>
                 <a:spcPts val="0"/>
               </a:spcAft>
-              <a:buSzPts val="1000"/>
+              <a:buSzPct val="100000"/>
               <a:buAutoNum type="arabicPeriod"/>
             </a:pPr>
             <a:r>
-              <a:rPr lang="de-DE" dirty="0"/>
+              <a:rPr lang="de-DE" sz="2400" dirty="0"/>
               <a:t>MVC</a:t>
             </a:r>
           </a:p>
@@ -23157,11 +23157,11 @@
               <a:spcAft>
                 <a:spcPts val="0"/>
               </a:spcAft>
-              <a:buSzPts val="1000"/>
+              <a:buSzPct val="100000"/>
               <a:buAutoNum type="arabicPeriod"/>
             </a:pPr>
             <a:r>
-              <a:rPr lang="de-DE" dirty="0"/>
+              <a:rPr lang="de-DE" sz="2400" dirty="0"/>
               <a:t>ROUTEN</a:t>
             </a:r>
           </a:p>
@@ -23173,12 +23173,12 @@
               <a:spcAft>
                 <a:spcPts val="0"/>
               </a:spcAft>
-              <a:buSzPts val="1000"/>
+              <a:buSzPct val="100000"/>
               <a:buAutoNum type="arabicPeriod"/>
             </a:pPr>
             <a:r>
-              <a:rPr lang="en" sz="1000" dirty="0"/>
-              <a:t>Autentifizierung</a:t>
+              <a:rPr lang="en" sz="2400" dirty="0"/>
+              <a:t>Authentifizierung</a:t>
             </a:r>
           </a:p>
           <a:p>
@@ -23189,11 +23189,11 @@
               <a:spcAft>
                 <a:spcPts val="0"/>
               </a:spcAft>
-              <a:buSzPts val="1000"/>
+              <a:buSzPct val="100000"/>
               <a:buAutoNum type="arabicPeriod"/>
             </a:pPr>
             <a:r>
-              <a:rPr lang="en" sz="1000" dirty="0"/>
+              <a:rPr lang="en" sz="2400" dirty="0"/>
               <a:t>JWT Verarbeitung</a:t>
             </a:r>
           </a:p>
@@ -23205,11 +23205,11 @@
               <a:spcAft>
                 <a:spcPts val="0"/>
               </a:spcAft>
-              <a:buSzPts val="1000"/>
+              <a:buSzPct val="100000"/>
               <a:buAutoNum type="arabicPeriod"/>
             </a:pPr>
             <a:r>
-              <a:rPr lang="en" sz="1000" dirty="0"/>
+              <a:rPr lang="en" sz="2400" dirty="0"/>
               <a:t>Kommunikation</a:t>
             </a:r>
           </a:p>
@@ -23221,11 +23221,11 @@
               <a:spcAft>
                 <a:spcPts val="0"/>
               </a:spcAft>
-              <a:buSzPts val="1000"/>
+              <a:buSzPct val="100000"/>
               <a:buAutoNum type="arabicPeriod"/>
             </a:pPr>
             <a:r>
-              <a:rPr lang="en" sz="1000" dirty="0"/>
+              <a:rPr lang="en" sz="2400" dirty="0"/>
               <a:t>Validierung</a:t>
             </a:r>
           </a:p>
@@ -23237,11 +23237,11 @@
               <a:spcAft>
                 <a:spcPts val="0"/>
               </a:spcAft>
-              <a:buSzPts val="1000"/>
+              <a:buSzPct val="100000"/>
               <a:buAutoNum type="arabicPeriod"/>
             </a:pPr>
             <a:r>
-              <a:rPr lang="de-DE" dirty="0"/>
+              <a:rPr lang="de-DE" sz="2400" dirty="0"/>
               <a:t>Angular</a:t>
             </a:r>
           </a:p>
@@ -23253,11 +23253,11 @@
               <a:spcAft>
                 <a:spcPts val="0"/>
               </a:spcAft>
-              <a:buSzPts val="1000"/>
+              <a:buSzPct val="100000"/>
               <a:buAutoNum type="arabicPeriod"/>
             </a:pPr>
             <a:r>
-              <a:rPr lang="de-DE" dirty="0"/>
+              <a:rPr lang="de-DE" sz="2400" dirty="0"/>
               <a:t>Material</a:t>
             </a:r>
           </a:p>
@@ -23269,14 +23269,14 @@
               <a:spcAft>
                 <a:spcPts val="0"/>
               </a:spcAft>
-              <a:buSzPts val="1000"/>
+              <a:buSzPct val="100000"/>
               <a:buAutoNum type="arabicPeriod"/>
             </a:pPr>
             <a:r>
-              <a:rPr lang="de-DE" dirty="0"/>
+              <a:rPr lang="de-DE" sz="2400" dirty="0"/>
               <a:t>Struktur</a:t>
             </a:r>
-            <a:endParaRPr dirty="0"/>
+            <a:endParaRPr sz="2400" dirty="0"/>
           </a:p>
         </p:txBody>
       </p:sp>

</xml_diff>

<commit_message>
finished presentation (animations and formatting)
</commit_message>
<xml_diff>
--- a/documentation/required documents/Presentation/Webasierter Datenkbankmanager - Präsentation.pptx
+++ b/documentation/required documents/Presentation/Webasierter Datenkbankmanager - Präsentation.pptx
@@ -35,12 +35,12 @@
   <p:notesSz cx="6858000" cy="9144000"/>
   <p:embeddedFontLst>
     <p:embeddedFont>
-      <p:font typeface="Fira Code" pitchFamily="1" charset="0"/>
+      <p:font typeface="Fira Code" panose="020B0809050000020004" pitchFamily="49" charset="0"/>
       <p:regular r:id="rId25"/>
       <p:bold r:id="rId26"/>
     </p:embeddedFont>
     <p:embeddedFont>
-      <p:font typeface="Fira Code Light" pitchFamily="1" charset="0"/>
+      <p:font typeface="Fira Code Light" panose="020B0809050000020004" pitchFamily="49" charset="0"/>
       <p:regular r:id="rId27"/>
     </p:embeddedFont>
     <p:embeddedFont>
@@ -12640,7 +12640,7 @@
         </p:nvGraphicFramePr>
         <p:xfrm>
           <a:off x="940844" y="1875291"/>
-          <a:ext cx="3755697" cy="2503005"/>
+          <a:ext cx="3755697" cy="2501862"/>
         </p:xfrm>
         <a:graphic>
           <a:graphicData uri="http://schemas.openxmlformats.org/drawingml/2006/table">
@@ -13420,13 +13420,13 @@
   <p:clrMapOvr>
     <a:masterClrMapping/>
   </p:clrMapOvr>
-  <mc:AlternateContent xmlns:mc="http://schemas.openxmlformats.org/markup-compatibility/2006">
-    <mc:Choice xmlns:p14="http://schemas.microsoft.com/office/powerpoint/2010/main" Requires="p14">
+  <mc:AlternateContent xmlns:mc="http://schemas.openxmlformats.org/markup-compatibility/2006" xmlns:p14="http://schemas.microsoft.com/office/powerpoint/2010/main">
+    <mc:Choice Requires="p14">
       <p:transition spd="med" p14:dur="700">
         <p:fade/>
       </p:transition>
     </mc:Choice>
-    <mc:Fallback>
+    <mc:Fallback xmlns="">
       <p:transition spd="med">
         <p:fade/>
       </p:transition>
@@ -14121,13 +14121,13 @@
   <p:clrMapOvr>
     <a:masterClrMapping/>
   </p:clrMapOvr>
-  <mc:AlternateContent xmlns:mc="http://schemas.openxmlformats.org/markup-compatibility/2006">
-    <mc:Choice xmlns:p14="http://schemas.microsoft.com/office/powerpoint/2010/main" Requires="p14">
+  <mc:AlternateContent xmlns:mc="http://schemas.openxmlformats.org/markup-compatibility/2006" xmlns:p14="http://schemas.microsoft.com/office/powerpoint/2010/main">
+    <mc:Choice Requires="p14">
       <p:transition spd="med" p14:dur="700">
         <p:fade/>
       </p:transition>
     </mc:Choice>
-    <mc:Fallback>
+    <mc:Fallback xmlns="">
       <p:transition spd="med">
         <p:fade/>
       </p:transition>
@@ -14905,13 +14905,13 @@
   <p:clrMapOvr>
     <a:masterClrMapping/>
   </p:clrMapOvr>
-  <mc:AlternateContent xmlns:mc="http://schemas.openxmlformats.org/markup-compatibility/2006">
-    <mc:Choice xmlns:p14="http://schemas.microsoft.com/office/powerpoint/2010/main" Requires="p14">
+  <mc:AlternateContent xmlns:mc="http://schemas.openxmlformats.org/markup-compatibility/2006" xmlns:p14="http://schemas.microsoft.com/office/powerpoint/2010/main">
+    <mc:Choice Requires="p14">
       <p:transition spd="med" p14:dur="700">
         <p:fade/>
       </p:transition>
     </mc:Choice>
-    <mc:Fallback>
+    <mc:Fallback xmlns="">
       <p:transition spd="med">
         <p:fade/>
       </p:transition>
@@ -15989,13 +15989,13 @@
   <p:clrMapOvr>
     <a:masterClrMapping/>
   </p:clrMapOvr>
-  <mc:AlternateContent xmlns:mc="http://schemas.openxmlformats.org/markup-compatibility/2006">
-    <mc:Choice xmlns:p14="http://schemas.microsoft.com/office/powerpoint/2010/main" Requires="p14">
+  <mc:AlternateContent xmlns:mc="http://schemas.openxmlformats.org/markup-compatibility/2006" xmlns:p14="http://schemas.microsoft.com/office/powerpoint/2010/main">
+    <mc:Choice Requires="p14">
       <p:transition spd="med" p14:dur="700">
         <p:fade/>
       </p:transition>
     </mc:Choice>
-    <mc:Fallback>
+    <mc:Fallback xmlns="">
       <p:transition spd="med">
         <p:fade/>
       </p:transition>
@@ -16923,13 +16923,13 @@
   <p:clrMapOvr>
     <a:masterClrMapping/>
   </p:clrMapOvr>
-  <mc:AlternateContent xmlns:mc="http://schemas.openxmlformats.org/markup-compatibility/2006">
-    <mc:Choice xmlns:p14="http://schemas.microsoft.com/office/powerpoint/2010/main" Requires="p14">
+  <mc:AlternateContent xmlns:mc="http://schemas.openxmlformats.org/markup-compatibility/2006" xmlns:p14="http://schemas.microsoft.com/office/powerpoint/2010/main">
+    <mc:Choice Requires="p14">
       <p:transition spd="med" p14:dur="700">
         <p:fade/>
       </p:transition>
     </mc:Choice>
-    <mc:Fallback>
+    <mc:Fallback xmlns="">
       <p:transition spd="med">
         <p:fade/>
       </p:transition>
@@ -17767,13 +17767,13 @@
   <p:clrMapOvr>
     <a:masterClrMapping/>
   </p:clrMapOvr>
-  <mc:AlternateContent xmlns:mc="http://schemas.openxmlformats.org/markup-compatibility/2006">
-    <mc:Choice xmlns:p14="http://schemas.microsoft.com/office/powerpoint/2010/main" Requires="p14">
+  <mc:AlternateContent xmlns:mc="http://schemas.openxmlformats.org/markup-compatibility/2006" xmlns:p14="http://schemas.microsoft.com/office/powerpoint/2010/main">
+    <mc:Choice Requires="p14">
       <p:transition spd="med" p14:dur="700">
         <p:fade/>
       </p:transition>
     </mc:Choice>
-    <mc:Fallback>
+    <mc:Fallback xmlns="">
       <p:transition spd="med">
         <p:fade/>
       </p:transition>
@@ -18358,8 +18358,8 @@
         </p:nvGrpSpPr>
         <p:grpSpPr>
           <a:xfrm>
-            <a:off x="2298175" y="2497092"/>
-            <a:ext cx="4850770" cy="149315"/>
+            <a:off x="2078843" y="2482068"/>
+            <a:ext cx="5310133" cy="179363"/>
             <a:chOff x="2374371" y="2938926"/>
             <a:chExt cx="4395247" cy="151849"/>
           </a:xfrm>
@@ -18611,13 +18611,13 @@
   <p:clrMapOvr>
     <a:masterClrMapping/>
   </p:clrMapOvr>
-  <mc:AlternateContent xmlns:mc="http://schemas.openxmlformats.org/markup-compatibility/2006">
-    <mc:Choice xmlns:p14="http://schemas.microsoft.com/office/powerpoint/2010/main" Requires="p14">
+  <mc:AlternateContent xmlns:mc="http://schemas.openxmlformats.org/markup-compatibility/2006" xmlns:p14="http://schemas.microsoft.com/office/powerpoint/2010/main">
+    <mc:Choice Requires="p14">
       <p:transition spd="med" p14:dur="700">
         <p:fade/>
       </p:transition>
     </mc:Choice>
-    <mc:Fallback>
+    <mc:Fallback xmlns="">
       <p:transition spd="med">
         <p:fade/>
       </p:transition>
@@ -19437,7 +19437,7 @@
         </p:blipFill>
         <p:spPr>
           <a:xfrm>
-            <a:off x="4251284" y="3448250"/>
+            <a:off x="4117082" y="3281388"/>
             <a:ext cx="899079" cy="899079"/>
           </a:xfrm>
           <a:prstGeom prst="rect">
@@ -19455,13 +19455,13 @@
   <p:clrMapOvr>
     <a:masterClrMapping/>
   </p:clrMapOvr>
-  <mc:AlternateContent xmlns:mc="http://schemas.openxmlformats.org/markup-compatibility/2006">
-    <mc:Choice xmlns:p14="http://schemas.microsoft.com/office/powerpoint/2010/main" Requires="p14">
+  <mc:AlternateContent xmlns:mc="http://schemas.openxmlformats.org/markup-compatibility/2006" xmlns:p14="http://schemas.microsoft.com/office/powerpoint/2010/main">
+    <mc:Choice Requires="p14">
       <p:transition spd="med" p14:dur="700">
         <p:fade/>
       </p:transition>
     </mc:Choice>
-    <mc:Fallback>
+    <mc:Fallback xmlns="">
       <p:transition spd="med">
         <p:fade/>
       </p:transition>
@@ -20031,10 +20031,9 @@
               <a:buNone/>
             </a:pPr>
             <a:r>
-              <a:rPr lang="en" dirty="0"/>
+              <a:rPr lang="de-DE" sz="2000" dirty="0"/>
               <a:t>Was ist es und wieso haben wir uns dafür entschieden?</a:t>
             </a:r>
-            <a:endParaRPr dirty="0"/>
           </a:p>
         </p:txBody>
       </p:sp>
@@ -20294,13 +20293,13 @@
   <p:clrMapOvr>
     <a:masterClrMapping/>
   </p:clrMapOvr>
-  <mc:AlternateContent xmlns:mc="http://schemas.openxmlformats.org/markup-compatibility/2006">
-    <mc:Choice xmlns:p14="http://schemas.microsoft.com/office/powerpoint/2010/main" Requires="p14">
+  <mc:AlternateContent xmlns:mc="http://schemas.openxmlformats.org/markup-compatibility/2006" xmlns:p14="http://schemas.microsoft.com/office/powerpoint/2010/main">
+    <mc:Choice Requires="p14">
       <p:transition spd="med" p14:dur="700">
         <p:fade/>
       </p:transition>
     </mc:Choice>
-    <mc:Fallback>
+    <mc:Fallback xmlns="">
       <p:transition spd="med">
         <p:fade/>
       </p:transition>
@@ -20950,7 +20949,7 @@
         <p:spPr>
           <a:xfrm>
             <a:off x="914400" y="1623731"/>
-            <a:ext cx="7315200" cy="1991379"/>
+            <a:ext cx="7315200" cy="2360774"/>
           </a:xfrm>
           <a:prstGeom prst="rect">
             <a:avLst/>
@@ -20975,7 +20974,7 @@
               <a:buChar char="•"/>
             </a:pPr>
             <a:r>
-              <a:rPr lang="de-DE" dirty="0">
+              <a:rPr lang="de-DE" sz="2000" dirty="0">
                 <a:solidFill>
                   <a:schemeClr val="bg1"/>
                 </a:solidFill>
@@ -20999,7 +20998,7 @@
               <a:buChar char="•"/>
             </a:pPr>
             <a:r>
-              <a:rPr lang="de-DE" dirty="0">
+              <a:rPr lang="de-DE" sz="2000" dirty="0">
                 <a:solidFill>
                   <a:schemeClr val="bg1"/>
                 </a:solidFill>
@@ -21022,29 +21021,8 @@
               <a:buFont typeface="Arial" panose="020B0604020202020204" pitchFamily="34" charset="0"/>
               <a:buChar char="•"/>
             </a:pPr>
-            <a:endParaRPr lang="de-DE" dirty="0">
-              <a:solidFill>
-                <a:schemeClr val="bg1"/>
-              </a:solidFill>
-              <a:latin typeface="Fira Code" panose="020B0809050000020004" pitchFamily="49" charset="0"/>
-              <a:ea typeface="Fira Code" panose="020B0809050000020004" pitchFamily="49" charset="0"/>
-              <a:cs typeface="Fira Code" panose="020B0809050000020004" pitchFamily="49" charset="0"/>
-            </a:endParaRPr>
-          </a:p>
-          <a:p>
-            <a:pPr marL="285750" indent="-285750">
-              <a:lnSpc>
-                <a:spcPct val="150000"/>
-              </a:lnSpc>
-              <a:buClr>
-                <a:schemeClr val="bg1"/>
-              </a:buClr>
-              <a:buSzPct val="150000"/>
-              <a:buFont typeface="Arial" panose="020B0604020202020204" pitchFamily="34" charset="0"/>
-              <a:buChar char="•"/>
-            </a:pPr>
             <a:r>
-              <a:rPr lang="de-DE" dirty="0">
+              <a:rPr lang="de-DE" sz="2000" dirty="0">
                 <a:solidFill>
                   <a:schemeClr val="bg1"/>
                 </a:solidFill>
@@ -21068,7 +21046,7 @@
               <a:buChar char="•"/>
             </a:pPr>
             <a:r>
-              <a:rPr lang="de-DE" dirty="0">
+              <a:rPr lang="de-DE" sz="2000" dirty="0">
                 <a:solidFill>
                   <a:schemeClr val="bg1"/>
                 </a:solidFill>
@@ -21092,7 +21070,7 @@
               <a:buChar char="•"/>
             </a:pPr>
             <a:r>
-              <a:rPr lang="de-DE" dirty="0">
+              <a:rPr lang="de-DE" sz="2000" dirty="0">
                 <a:solidFill>
                   <a:schemeClr val="bg1"/>
                 </a:solidFill>
@@ -21164,13 +21142,13 @@
   <p:clrMapOvr>
     <a:masterClrMapping/>
   </p:clrMapOvr>
-  <mc:AlternateContent xmlns:mc="http://schemas.openxmlformats.org/markup-compatibility/2006">
-    <mc:Choice xmlns:p14="http://schemas.microsoft.com/office/powerpoint/2010/main" Requires="p14">
+  <mc:AlternateContent xmlns:mc="http://schemas.openxmlformats.org/markup-compatibility/2006" xmlns:p14="http://schemas.microsoft.com/office/powerpoint/2010/main">
+    <mc:Choice Requires="p14">
       <p:transition spd="med" p14:dur="700">
         <p:fade/>
       </p:transition>
     </mc:Choice>
-    <mc:Fallback>
+    <mc:Fallback xmlns="">
       <p:transition spd="med">
         <p:fade/>
       </p:transition>
@@ -21334,7 +21312,7 @@
                                         <p:tgtEl>
                                           <p:spTgt spid="6">
                                             <p:txEl>
-                                              <p:pRg st="3" end="3"/>
+                                              <p:pRg st="2" end="2"/>
                                             </p:txEl>
                                           </p:spTgt>
                                         </p:tgtEl>
@@ -21352,7 +21330,7 @@
                                         <p:tgtEl>
                                           <p:spTgt spid="6">
                                             <p:txEl>
-                                              <p:pRg st="3" end="3"/>
+                                              <p:pRg st="2" end="2"/>
                                             </p:txEl>
                                           </p:spTgt>
                                         </p:tgtEl>
@@ -21395,7 +21373,7 @@
                                         <p:tgtEl>
                                           <p:spTgt spid="6">
                                             <p:txEl>
-                                              <p:pRg st="4" end="4"/>
+                                              <p:pRg st="3" end="3"/>
                                             </p:txEl>
                                           </p:spTgt>
                                         </p:tgtEl>
@@ -21413,7 +21391,7 @@
                                         <p:tgtEl>
                                           <p:spTgt spid="6">
                                             <p:txEl>
-                                              <p:pRg st="4" end="4"/>
+                                              <p:pRg st="3" end="3"/>
                                             </p:txEl>
                                           </p:spTgt>
                                         </p:tgtEl>
@@ -21456,7 +21434,7 @@
                                         <p:tgtEl>
                                           <p:spTgt spid="6">
                                             <p:txEl>
-                                              <p:pRg st="5" end="5"/>
+                                              <p:pRg st="4" end="4"/>
                                             </p:txEl>
                                           </p:spTgt>
                                         </p:tgtEl>
@@ -21474,7 +21452,7 @@
                                         <p:tgtEl>
                                           <p:spTgt spid="6">
                                             <p:txEl>
-                                              <p:pRg st="5" end="5"/>
+                                              <p:pRg st="4" end="4"/>
                                             </p:txEl>
                                           </p:spTgt>
                                         </p:tgtEl>
@@ -22075,10 +22053,10 @@
               <a:buNone/>
             </a:pPr>
             <a:r>
-              <a:rPr lang="en" dirty="0"/>
+              <a:rPr lang="en" sz="2000" dirty="0"/>
               <a:t>Inwiefern hat uns Material geholfen?</a:t>
             </a:r>
-            <a:endParaRPr dirty="0"/>
+            <a:endParaRPr sz="2000" dirty="0"/>
           </a:p>
         </p:txBody>
       </p:sp>
@@ -22313,13 +22291,13 @@
   <p:clrMapOvr>
     <a:masterClrMapping/>
   </p:clrMapOvr>
-  <mc:AlternateContent xmlns:mc="http://schemas.openxmlformats.org/markup-compatibility/2006">
-    <mc:Choice xmlns:p14="http://schemas.microsoft.com/office/powerpoint/2010/main" Requires="p14">
+  <mc:AlternateContent xmlns:mc="http://schemas.openxmlformats.org/markup-compatibility/2006" xmlns:p14="http://schemas.microsoft.com/office/powerpoint/2010/main">
+    <mc:Choice Requires="p14">
       <p:transition spd="med" p14:dur="700">
         <p:fade/>
       </p:transition>
     </mc:Choice>
-    <mc:Fallback>
+    <mc:Fallback xmlns="">
       <p:transition spd="med">
         <p:fade/>
       </p:transition>
@@ -23514,13 +23492,13 @@
   <p:clrMapOvr>
     <a:masterClrMapping/>
   </p:clrMapOvr>
-  <mc:AlternateContent xmlns:mc="http://schemas.openxmlformats.org/markup-compatibility/2006">
-    <mc:Choice xmlns:p14="http://schemas.microsoft.com/office/powerpoint/2010/main" Requires="p14">
+  <mc:AlternateContent xmlns:mc="http://schemas.openxmlformats.org/markup-compatibility/2006" xmlns:p14="http://schemas.microsoft.com/office/powerpoint/2010/main">
+    <mc:Choice Requires="p14">
       <p:transition spd="med" p14:dur="700">
         <p:fade/>
       </p:transition>
     </mc:Choice>
-    <mc:Fallback>
+    <mc:Fallback xmlns="">
       <p:transition spd="med">
         <p:fade/>
       </p:transition>
@@ -24170,7 +24148,7 @@
         <p:spPr>
           <a:xfrm>
             <a:off x="914400" y="1623731"/>
-            <a:ext cx="7315200" cy="1034899"/>
+            <a:ext cx="7315200" cy="1899110"/>
           </a:xfrm>
           <a:prstGeom prst="rect">
             <a:avLst/>
@@ -24195,7 +24173,7 @@
               <a:buChar char="•"/>
             </a:pPr>
             <a:r>
-              <a:rPr lang="de-DE" dirty="0">
+              <a:rPr lang="de-DE" sz="2000" dirty="0">
                 <a:solidFill>
                   <a:schemeClr val="bg1"/>
                 </a:solidFill>
@@ -24219,7 +24197,7 @@
               <a:buChar char="•"/>
             </a:pPr>
             <a:r>
-              <a:rPr lang="de-DE" dirty="0">
+              <a:rPr lang="de-DE" sz="2000" dirty="0">
                 <a:solidFill>
                   <a:schemeClr val="bg1"/>
                 </a:solidFill>
@@ -24241,7 +24219,7 @@
               <a:buSzPct val="150000"/>
             </a:pPr>
             <a:r>
-              <a:rPr lang="de-DE" dirty="0">
+              <a:rPr lang="de-DE" sz="2000" dirty="0">
                 <a:solidFill>
                   <a:schemeClr val="bg1"/>
                 </a:solidFill>
@@ -24313,13 +24291,13 @@
   <p:clrMapOvr>
     <a:masterClrMapping/>
   </p:clrMapOvr>
-  <mc:AlternateContent xmlns:mc="http://schemas.openxmlformats.org/markup-compatibility/2006">
-    <mc:Choice xmlns:p14="http://schemas.microsoft.com/office/powerpoint/2010/main" Requires="p14">
+  <mc:AlternateContent xmlns:mc="http://schemas.openxmlformats.org/markup-compatibility/2006" xmlns:p14="http://schemas.microsoft.com/office/powerpoint/2010/main">
+    <mc:Choice Requires="p14">
       <p:transition spd="med" p14:dur="700">
         <p:fade/>
       </p:transition>
     </mc:Choice>
-    <mc:Fallback>
+    <mc:Fallback xmlns="">
       <p:transition spd="med">
         <p:fade/>
       </p:transition>
@@ -25084,10 +25062,10 @@
               <a:buNone/>
             </a:pPr>
             <a:r>
-              <a:rPr lang="en" dirty="0"/>
+              <a:rPr lang="en" sz="2000" dirty="0"/>
               <a:t>Wie haben wir unsere Projektstruktur aufgebaut und wieso?</a:t>
             </a:r>
-            <a:endParaRPr dirty="0"/>
+            <a:endParaRPr sz="2000" dirty="0"/>
           </a:p>
         </p:txBody>
       </p:sp>
@@ -25322,13 +25300,13 @@
   <p:clrMapOvr>
     <a:masterClrMapping/>
   </p:clrMapOvr>
-  <mc:AlternateContent xmlns:mc="http://schemas.openxmlformats.org/markup-compatibility/2006">
-    <mc:Choice xmlns:p14="http://schemas.microsoft.com/office/powerpoint/2010/main" Requires="p14">
+  <mc:AlternateContent xmlns:mc="http://schemas.openxmlformats.org/markup-compatibility/2006" xmlns:p14="http://schemas.microsoft.com/office/powerpoint/2010/main">
+    <mc:Choice Requires="p14">
       <p:transition spd="med" p14:dur="700">
         <p:fade/>
       </p:transition>
     </mc:Choice>
-    <mc:Fallback>
+    <mc:Fallback xmlns="">
       <p:transition spd="med">
         <p:fade/>
       </p:transition>
@@ -26112,13 +26090,13 @@
   <p:clrMapOvr>
     <a:masterClrMapping/>
   </p:clrMapOvr>
-  <mc:AlternateContent xmlns:mc="http://schemas.openxmlformats.org/markup-compatibility/2006">
-    <mc:Choice xmlns:p14="http://schemas.microsoft.com/office/powerpoint/2010/main" Requires="p14">
+  <mc:AlternateContent xmlns:mc="http://schemas.openxmlformats.org/markup-compatibility/2006" xmlns:p14="http://schemas.microsoft.com/office/powerpoint/2010/main">
+    <mc:Choice Requires="p14">
       <p:transition spd="med" p14:dur="700">
         <p:fade/>
       </p:transition>
     </mc:Choice>
-    <mc:Fallback>
+    <mc:Fallback xmlns="">
       <p:transition spd="med">
         <p:fade/>
       </p:transition>
@@ -26962,13 +26940,13 @@
   <p:clrMapOvr>
     <a:masterClrMapping/>
   </p:clrMapOvr>
-  <mc:AlternateContent xmlns:mc="http://schemas.openxmlformats.org/markup-compatibility/2006">
-    <mc:Choice xmlns:p14="http://schemas.microsoft.com/office/powerpoint/2010/main" Requires="p14">
+  <mc:AlternateContent xmlns:mc="http://schemas.openxmlformats.org/markup-compatibility/2006" xmlns:p14="http://schemas.microsoft.com/office/powerpoint/2010/main">
+    <mc:Choice Requires="p14">
       <p:transition spd="med" p14:dur="700">
         <p:fade/>
       </p:transition>
     </mc:Choice>
-    <mc:Fallback>
+    <mc:Fallback xmlns="">
       <p:transition spd="med">
         <p:fade/>
       </p:transition>
@@ -28095,13 +28073,13 @@
   <p:clrMapOvr>
     <a:masterClrMapping/>
   </p:clrMapOvr>
-  <mc:AlternateContent xmlns:mc="http://schemas.openxmlformats.org/markup-compatibility/2006">
-    <mc:Choice xmlns:p14="http://schemas.microsoft.com/office/powerpoint/2010/main" Requires="p14">
+  <mc:AlternateContent xmlns:mc="http://schemas.openxmlformats.org/markup-compatibility/2006" xmlns:p14="http://schemas.microsoft.com/office/powerpoint/2010/main">
+    <mc:Choice Requires="p14">
       <p:transition spd="med" p14:dur="700">
         <p:fade/>
       </p:transition>
     </mc:Choice>
-    <mc:Fallback>
+    <mc:Fallback xmlns="">
       <p:transition spd="med">
         <p:fade/>
       </p:transition>
@@ -29508,13 +29486,13 @@
   <p:clrMapOvr>
     <a:masterClrMapping/>
   </p:clrMapOvr>
-  <mc:AlternateContent xmlns:mc="http://schemas.openxmlformats.org/markup-compatibility/2006">
-    <mc:Choice xmlns:p14="http://schemas.microsoft.com/office/powerpoint/2010/main" Requires="p14">
+  <mc:AlternateContent xmlns:mc="http://schemas.openxmlformats.org/markup-compatibility/2006" xmlns:p14="http://schemas.microsoft.com/office/powerpoint/2010/main">
+    <mc:Choice Requires="p14">
       <p:transition spd="med" p14:dur="700">
         <p:fade/>
       </p:transition>
     </mc:Choice>
-    <mc:Fallback>
+    <mc:Fallback xmlns="">
       <p:transition spd="med">
         <p:fade/>
       </p:transition>
@@ -29669,6 +29647,41 @@
                                   </p:childTnLst>
                                 </p:cTn>
                               </p:par>
+                              <p:par>
+                                <p:cTn id="14" presetID="10" presetClass="entr" presetSubtype="0" fill="hold" nodeType="withEffect">
+                                  <p:stCondLst>
+                                    <p:cond delay="0"/>
+                                  </p:stCondLst>
+                                  <p:childTnLst>
+                                    <p:set>
+                                      <p:cBhvr>
+                                        <p:cTn id="15" dur="1" fill="hold">
+                                          <p:stCondLst>
+                                            <p:cond delay="0"/>
+                                          </p:stCondLst>
+                                        </p:cTn>
+                                        <p:tgtEl>
+                                          <p:spTgt spid="517"/>
+                                        </p:tgtEl>
+                                        <p:attrNameLst>
+                                          <p:attrName>style.visibility</p:attrName>
+                                        </p:attrNameLst>
+                                      </p:cBhvr>
+                                      <p:to>
+                                        <p:strVal val="visible"/>
+                                      </p:to>
+                                    </p:set>
+                                    <p:animEffect transition="in" filter="fade">
+                                      <p:cBhvr>
+                                        <p:cTn id="16" dur="500"/>
+                                        <p:tgtEl>
+                                          <p:spTgt spid="517"/>
+                                        </p:tgtEl>
+                                      </p:cBhvr>
+                                    </p:animEffect>
+                                  </p:childTnLst>
+                                </p:cTn>
+                              </p:par>
                             </p:childTnLst>
                           </p:cTn>
                         </p:par>
@@ -29676,26 +29689,26 @@
                     </p:cTn>
                   </p:par>
                   <p:par>
-                    <p:cTn id="14" fill="hold">
+                    <p:cTn id="17" fill="hold">
                       <p:stCondLst>
                         <p:cond delay="indefinite"/>
                       </p:stCondLst>
                       <p:childTnLst>
                         <p:par>
-                          <p:cTn id="15" fill="hold">
+                          <p:cTn id="18" fill="hold">
                             <p:stCondLst>
                               <p:cond delay="0"/>
                             </p:stCondLst>
                             <p:childTnLst>
                               <p:par>
-                                <p:cTn id="16" presetID="10" presetClass="entr" presetSubtype="0" fill="hold" nodeType="clickEffect">
+                                <p:cTn id="19" presetID="10" presetClass="entr" presetSubtype="0" fill="hold" nodeType="clickEffect">
                                   <p:stCondLst>
                                     <p:cond delay="0"/>
                                   </p:stCondLst>
                                   <p:childTnLst>
                                     <p:set>
                                       <p:cBhvr>
-                                        <p:cTn id="17" dur="1" fill="hold">
+                                        <p:cTn id="20" dur="1" fill="hold">
                                           <p:stCondLst>
                                             <p:cond delay="0"/>
                                           </p:stCondLst>
@@ -29713,7 +29726,7 @@
                                     </p:set>
                                     <p:animEffect transition="in" filter="fade">
                                       <p:cBhvr>
-                                        <p:cTn id="18" dur="500"/>
+                                        <p:cTn id="21" dur="500"/>
                                         <p:tgtEl>
                                           <p:spTgt spid="21"/>
                                         </p:tgtEl>
@@ -30704,13 +30717,13 @@
   <p:clrMapOvr>
     <a:masterClrMapping/>
   </p:clrMapOvr>
-  <mc:AlternateContent xmlns:mc="http://schemas.openxmlformats.org/markup-compatibility/2006">
-    <mc:Choice xmlns:p14="http://schemas.microsoft.com/office/powerpoint/2010/main" Requires="p14">
+  <mc:AlternateContent xmlns:mc="http://schemas.openxmlformats.org/markup-compatibility/2006" xmlns:p14="http://schemas.microsoft.com/office/powerpoint/2010/main">
+    <mc:Choice Requires="p14">
       <p:transition spd="med" p14:dur="700">
         <p:fade/>
       </p:transition>
     </mc:Choice>
-    <mc:Fallback>
+    <mc:Fallback xmlns="">
       <p:transition spd="med">
         <p:fade/>
       </p:transition>
@@ -30779,6 +30792,41 @@
                                   </p:childTnLst>
                                 </p:cTn>
                               </p:par>
+                              <p:par>
+                                <p:cTn id="8" presetID="10" presetClass="entr" presetSubtype="0" fill="hold" nodeType="withEffect">
+                                  <p:stCondLst>
+                                    <p:cond delay="0"/>
+                                  </p:stCondLst>
+                                  <p:childTnLst>
+                                    <p:set>
+                                      <p:cBhvr>
+                                        <p:cTn id="9" dur="1" fill="hold">
+                                          <p:stCondLst>
+                                            <p:cond delay="0"/>
+                                          </p:stCondLst>
+                                        </p:cTn>
+                                        <p:tgtEl>
+                                          <p:spTgt spid="517"/>
+                                        </p:tgtEl>
+                                        <p:attrNameLst>
+                                          <p:attrName>style.visibility</p:attrName>
+                                        </p:attrNameLst>
+                                      </p:cBhvr>
+                                      <p:to>
+                                        <p:strVal val="visible"/>
+                                      </p:to>
+                                    </p:set>
+                                    <p:animEffect transition="in" filter="fade">
+                                      <p:cBhvr>
+                                        <p:cTn id="10" dur="500"/>
+                                        <p:tgtEl>
+                                          <p:spTgt spid="517"/>
+                                        </p:tgtEl>
+                                      </p:cBhvr>
+                                    </p:animEffect>
+                                  </p:childTnLst>
+                                </p:cTn>
+                              </p:par>
                             </p:childTnLst>
                           </p:cTn>
                         </p:par>
@@ -30786,26 +30834,26 @@
                     </p:cTn>
                   </p:par>
                   <p:par>
-                    <p:cTn id="8" fill="hold">
+                    <p:cTn id="11" fill="hold">
                       <p:stCondLst>
                         <p:cond delay="indefinite"/>
                       </p:stCondLst>
                       <p:childTnLst>
                         <p:par>
-                          <p:cTn id="9" fill="hold">
+                          <p:cTn id="12" fill="hold">
                             <p:stCondLst>
                               <p:cond delay="0"/>
                             </p:stCondLst>
                             <p:childTnLst>
                               <p:par>
-                                <p:cTn id="10" presetID="10" presetClass="entr" presetSubtype="0" fill="hold" grpId="0" nodeType="clickEffect">
+                                <p:cTn id="13" presetID="10" presetClass="entr" presetSubtype="0" fill="hold" grpId="0" nodeType="clickEffect">
                                   <p:stCondLst>
                                     <p:cond delay="0"/>
                                   </p:stCondLst>
                                   <p:childTnLst>
                                     <p:set>
                                       <p:cBhvr>
-                                        <p:cTn id="11" dur="1" fill="hold">
+                                        <p:cTn id="14" dur="1" fill="hold">
                                           <p:stCondLst>
                                             <p:cond delay="0"/>
                                           </p:stCondLst>
@@ -30827,7 +30875,7 @@
                                     </p:set>
                                     <p:animEffect transition="in" filter="fade">
                                       <p:cBhvr>
-                                        <p:cTn id="12" dur="500"/>
+                                        <p:cTn id="15" dur="500"/>
                                         <p:tgtEl>
                                           <p:spTgt spid="513">
                                             <p:txEl>
@@ -30847,26 +30895,26 @@
                     </p:cTn>
                   </p:par>
                   <p:par>
-                    <p:cTn id="13" fill="hold">
+                    <p:cTn id="16" fill="hold">
                       <p:stCondLst>
                         <p:cond delay="indefinite"/>
                       </p:stCondLst>
                       <p:childTnLst>
                         <p:par>
-                          <p:cTn id="14" fill="hold">
+                          <p:cTn id="17" fill="hold">
                             <p:stCondLst>
                               <p:cond delay="0"/>
                             </p:stCondLst>
                             <p:childTnLst>
                               <p:par>
-                                <p:cTn id="15" presetID="10" presetClass="entr" presetSubtype="0" fill="hold" grpId="0" nodeType="clickEffect">
+                                <p:cTn id="18" presetID="10" presetClass="entr" presetSubtype="0" fill="hold" grpId="0" nodeType="clickEffect">
                                   <p:stCondLst>
                                     <p:cond delay="0"/>
                                   </p:stCondLst>
                                   <p:childTnLst>
                                     <p:set>
                                       <p:cBhvr>
-                                        <p:cTn id="16" dur="1" fill="hold">
+                                        <p:cTn id="19" dur="1" fill="hold">
                                           <p:stCondLst>
                                             <p:cond delay="0"/>
                                           </p:stCondLst>
@@ -30888,7 +30936,7 @@
                                     </p:set>
                                     <p:animEffect transition="in" filter="fade">
                                       <p:cBhvr>
-                                        <p:cTn id="17" dur="500"/>
+                                        <p:cTn id="20" dur="500"/>
                                         <p:tgtEl>
                                           <p:spTgt spid="513">
                                             <p:txEl>
@@ -30908,26 +30956,26 @@
                     </p:cTn>
                   </p:par>
                   <p:par>
-                    <p:cTn id="18" fill="hold">
+                    <p:cTn id="21" fill="hold">
                       <p:stCondLst>
                         <p:cond delay="indefinite"/>
                       </p:stCondLst>
                       <p:childTnLst>
                         <p:par>
-                          <p:cTn id="19" fill="hold">
+                          <p:cTn id="22" fill="hold">
                             <p:stCondLst>
                               <p:cond delay="0"/>
                             </p:stCondLst>
                             <p:childTnLst>
                               <p:par>
-                                <p:cTn id="20" presetID="10" presetClass="entr" presetSubtype="0" fill="hold" grpId="0" nodeType="clickEffect">
+                                <p:cTn id="23" presetID="10" presetClass="entr" presetSubtype="0" fill="hold" grpId="0" nodeType="clickEffect">
                                   <p:stCondLst>
                                     <p:cond delay="0"/>
                                   </p:stCondLst>
                                   <p:childTnLst>
                                     <p:set>
                                       <p:cBhvr>
-                                        <p:cTn id="21" dur="1" fill="hold">
+                                        <p:cTn id="24" dur="1" fill="hold">
                                           <p:stCondLst>
                                             <p:cond delay="0"/>
                                           </p:stCondLst>
@@ -30949,7 +30997,7 @@
                                     </p:set>
                                     <p:animEffect transition="in" filter="fade">
                                       <p:cBhvr>
-                                        <p:cTn id="22" dur="500"/>
+                                        <p:cTn id="25" dur="500"/>
                                         <p:tgtEl>
                                           <p:spTgt spid="513">
                                             <p:txEl>
@@ -30969,26 +31017,26 @@
                     </p:cTn>
                   </p:par>
                   <p:par>
-                    <p:cTn id="23" fill="hold">
+                    <p:cTn id="26" fill="hold">
                       <p:stCondLst>
                         <p:cond delay="indefinite"/>
                       </p:stCondLst>
                       <p:childTnLst>
                         <p:par>
-                          <p:cTn id="24" fill="hold">
+                          <p:cTn id="27" fill="hold">
                             <p:stCondLst>
                               <p:cond delay="0"/>
                             </p:stCondLst>
                             <p:childTnLst>
                               <p:par>
-                                <p:cTn id="25" presetID="10" presetClass="entr" presetSubtype="0" fill="hold" nodeType="clickEffect">
+                                <p:cTn id="28" presetID="10" presetClass="entr" presetSubtype="0" fill="hold" nodeType="clickEffect">
                                   <p:stCondLst>
                                     <p:cond delay="0"/>
                                   </p:stCondLst>
                                   <p:childTnLst>
                                     <p:set>
                                       <p:cBhvr>
-                                        <p:cTn id="26" dur="1" fill="hold">
+                                        <p:cTn id="29" dur="1" fill="hold">
                                           <p:stCondLst>
                                             <p:cond delay="0"/>
                                           </p:stCondLst>
@@ -31006,7 +31054,7 @@
                                     </p:set>
                                     <p:animEffect transition="in" filter="fade">
                                       <p:cBhvr>
-                                        <p:cTn id="27" dur="500"/>
+                                        <p:cTn id="30" dur="500"/>
                                         <p:tgtEl>
                                           <p:spTgt spid="3"/>
                                         </p:tgtEl>
@@ -31022,26 +31070,26 @@
                     </p:cTn>
                   </p:par>
                   <p:par>
-                    <p:cTn id="28" fill="hold">
+                    <p:cTn id="31" fill="hold">
                       <p:stCondLst>
                         <p:cond delay="indefinite"/>
                       </p:stCondLst>
                       <p:childTnLst>
                         <p:par>
-                          <p:cTn id="29" fill="hold">
+                          <p:cTn id="32" fill="hold">
                             <p:stCondLst>
                               <p:cond delay="0"/>
                             </p:stCondLst>
                             <p:childTnLst>
                               <p:par>
-                                <p:cTn id="30" presetID="10" presetClass="entr" presetSubtype="0" fill="hold" nodeType="clickEffect">
+                                <p:cTn id="33" presetID="10" presetClass="entr" presetSubtype="0" fill="hold" nodeType="clickEffect">
                                   <p:stCondLst>
                                     <p:cond delay="0"/>
                                   </p:stCondLst>
                                   <p:childTnLst>
                                     <p:set>
                                       <p:cBhvr>
-                                        <p:cTn id="31" dur="1" fill="hold">
+                                        <p:cTn id="34" dur="1" fill="hold">
                                           <p:stCondLst>
                                             <p:cond delay="0"/>
                                           </p:stCondLst>
@@ -31059,7 +31107,7 @@
                                     </p:set>
                                     <p:animEffect transition="in" filter="fade">
                                       <p:cBhvr>
-                                        <p:cTn id="32" dur="500"/>
+                                        <p:cTn id="35" dur="500"/>
                                         <p:tgtEl>
                                           <p:spTgt spid="7"/>
                                         </p:tgtEl>
@@ -31096,7 +31144,7 @@
       </p:par>
     </p:tnLst>
     <p:bldLst>
-      <p:bldP spid="513" grpId="0" build="p"/>
+      <p:bldP spid="513" grpId="0" uiExpand="1" build="p"/>
     </p:bldLst>
   </p:timing>
 </p:sld>
@@ -33386,13 +33434,13 @@
   <p:clrMapOvr>
     <a:masterClrMapping/>
   </p:clrMapOvr>
-  <mc:AlternateContent xmlns:mc="http://schemas.openxmlformats.org/markup-compatibility/2006">
-    <mc:Choice xmlns:p14="http://schemas.microsoft.com/office/powerpoint/2010/main" Requires="p14">
+  <mc:AlternateContent xmlns:mc="http://schemas.openxmlformats.org/markup-compatibility/2006" xmlns:p14="http://schemas.microsoft.com/office/powerpoint/2010/main">
+    <mc:Choice Requires="p14">
       <p:transition spd="med" p14:dur="700">
         <p:fade/>
       </p:transition>
     </mc:Choice>
-    <mc:Fallback>
+    <mc:Fallback xmlns="">
       <p:transition spd="med">
         <p:fade/>
       </p:transition>
@@ -34589,13 +34637,13 @@
   <p:clrMapOvr>
     <a:masterClrMapping/>
   </p:clrMapOvr>
-  <mc:AlternateContent xmlns:mc="http://schemas.openxmlformats.org/markup-compatibility/2006">
-    <mc:Choice xmlns:p14="http://schemas.microsoft.com/office/powerpoint/2010/main" Requires="p14">
+  <mc:AlternateContent xmlns:mc="http://schemas.openxmlformats.org/markup-compatibility/2006" xmlns:p14="http://schemas.microsoft.com/office/powerpoint/2010/main">
+    <mc:Choice Requires="p14">
       <p:transition spd="med" p14:dur="700">
         <p:fade/>
       </p:transition>
     </mc:Choice>
-    <mc:Fallback>
+    <mc:Fallback xmlns="">
       <p:transition spd="med">
         <p:fade/>
       </p:transition>
@@ -35853,13 +35901,13 @@
   <p:clrMapOvr>
     <a:masterClrMapping/>
   </p:clrMapOvr>
-  <mc:AlternateContent xmlns:mc="http://schemas.openxmlformats.org/markup-compatibility/2006">
-    <mc:Choice xmlns:p14="http://schemas.microsoft.com/office/powerpoint/2010/main" Requires="p14">
+  <mc:AlternateContent xmlns:mc="http://schemas.openxmlformats.org/markup-compatibility/2006" xmlns:p14="http://schemas.microsoft.com/office/powerpoint/2010/main">
+    <mc:Choice Requires="p14">
       <p:transition spd="med" p14:dur="700">
         <p:fade/>
       </p:transition>
     </mc:Choice>
-    <mc:Fallback>
+    <mc:Fallback xmlns="">
       <p:transition spd="med">
         <p:fade/>
       </p:transition>

</xml_diff>

<commit_message>
final presentation file (post-präsi commit)
</commit_message>
<xml_diff>
--- a/documentation/required documents/Presentation/Webasierter Datenkbankmanager - Präsentation.pptx
+++ b/documentation/required documents/Presentation/Webasierter Datenkbankmanager - Präsentation.pptx
@@ -5,7 +5,7 @@
     <p:sldMasterId id="2147483676" r:id="rId1"/>
   </p:sldMasterIdLst>
   <p:notesMasterIdLst>
-    <p:notesMasterId r:id="rId24"/>
+    <p:notesMasterId r:id="rId25"/>
   </p:notesMasterIdLst>
   <p:sldIdLst>
     <p:sldId id="256" r:id="rId2"/>
@@ -30,28 +30,29 @@
     <p:sldId id="364" r:id="rId21"/>
     <p:sldId id="342" r:id="rId22"/>
     <p:sldId id="365" r:id="rId23"/>
+    <p:sldId id="366" r:id="rId24"/>
   </p:sldIdLst>
   <p:sldSz cx="9144000" cy="5143500" type="screen16x9"/>
   <p:notesSz cx="6858000" cy="9144000"/>
   <p:embeddedFontLst>
     <p:embeddedFont>
-      <p:font typeface="Fira Code" panose="020B0809050000020004" pitchFamily="49" charset="0"/>
-      <p:regular r:id="rId25"/>
-      <p:bold r:id="rId26"/>
+      <p:font typeface="Fira Code" pitchFamily="1" charset="0"/>
+      <p:regular r:id="rId26"/>
+      <p:bold r:id="rId27"/>
     </p:embeddedFont>
     <p:embeddedFont>
-      <p:font typeface="Fira Code Light" panose="020B0809050000020004" pitchFamily="49" charset="0"/>
-      <p:regular r:id="rId27"/>
+      <p:font typeface="Fira Code Light" pitchFamily="1" charset="0"/>
+      <p:regular r:id="rId28"/>
     </p:embeddedFont>
     <p:embeddedFont>
       <p:font typeface="Oswald" panose="00000500000000000000" pitchFamily="2" charset="0"/>
-      <p:regular r:id="rId28"/>
-      <p:bold r:id="rId29"/>
+      <p:regular r:id="rId29"/>
+      <p:bold r:id="rId30"/>
     </p:embeddedFont>
     <p:embeddedFont>
       <p:font typeface="Roboto Condensed Light" panose="02000000000000000000" pitchFamily="2" charset="0"/>
-      <p:regular r:id="rId30"/>
-      <p:italic r:id="rId31"/>
+      <p:regular r:id="rId31"/>
+      <p:italic r:id="rId32"/>
     </p:embeddedFont>
   </p:embeddedFontLst>
   <p:defaultTextStyle>
@@ -2026,6 +2027,115 @@
         </p:txBody>
       </p:sp>
     </p:spTree>
+  </p:cSld>
+  <p:clrMapOvr>
+    <a:masterClrMapping/>
+  </p:clrMapOvr>
+</p:notes>
+</file>
+
+<file path=ppt/notesSlides/notesSlide20.xml><?xml version="1.0" encoding="utf-8"?>
+<p:notes xmlns:a="http://schemas.openxmlformats.org/drawingml/2006/main" xmlns:r="http://schemas.openxmlformats.org/officeDocument/2006/relationships" xmlns:p="http://schemas.openxmlformats.org/presentationml/2006/main" showMasterSp="0" showMasterPhAnim="0">
+  <p:cSld>
+    <p:spTree>
+      <p:nvGrpSpPr>
+        <p:cNvPr id="1" name="Shape 460"/>
+        <p:cNvGrpSpPr/>
+        <p:nvPr/>
+      </p:nvGrpSpPr>
+      <p:grpSpPr>
+        <a:xfrm>
+          <a:off x="0" y="0"/>
+          <a:ext cx="0" cy="0"/>
+          <a:chOff x="0" y="0"/>
+          <a:chExt cx="0" cy="0"/>
+        </a:xfrm>
+      </p:grpSpPr>
+      <p:sp>
+        <p:nvSpPr>
+          <p:cNvPr id="461" name="Google Shape;461;gf658401715_0_1:notes"/>
+          <p:cNvSpPr>
+            <a:spLocks noGrp="1" noRot="1" noChangeAspect="1"/>
+          </p:cNvSpPr>
+          <p:nvPr>
+            <p:ph type="sldImg" idx="2"/>
+          </p:nvPr>
+        </p:nvSpPr>
+        <p:spPr>
+          <a:xfrm>
+            <a:off x="381000" y="685800"/>
+            <a:ext cx="6096000" cy="3429000"/>
+          </a:xfrm>
+          <a:custGeom>
+            <a:avLst/>
+            <a:gdLst/>
+            <a:ahLst/>
+            <a:cxnLst/>
+            <a:rect l="l" t="t" r="r" b="b"/>
+            <a:pathLst>
+              <a:path w="120000" h="120000" extrusionOk="0">
+                <a:moveTo>
+                  <a:pt x="0" y="0"/>
+                </a:moveTo>
+                <a:lnTo>
+                  <a:pt x="120000" y="0"/>
+                </a:lnTo>
+                <a:lnTo>
+                  <a:pt x="120000" y="120000"/>
+                </a:lnTo>
+                <a:lnTo>
+                  <a:pt x="0" y="120000"/>
+                </a:lnTo>
+                <a:close/>
+              </a:path>
+            </a:pathLst>
+          </a:custGeom>
+        </p:spPr>
+      </p:sp>
+      <p:sp>
+        <p:nvSpPr>
+          <p:cNvPr id="462" name="Google Shape;462;gf658401715_0_1:notes"/>
+          <p:cNvSpPr txBox="1">
+            <a:spLocks noGrp="1"/>
+          </p:cNvSpPr>
+          <p:nvPr>
+            <p:ph type="body" idx="1"/>
+          </p:nvPr>
+        </p:nvSpPr>
+        <p:spPr>
+          <a:xfrm>
+            <a:off x="685800" y="4343400"/>
+            <a:ext cx="5486400" cy="4114800"/>
+          </a:xfrm>
+          <a:prstGeom prst="rect">
+            <a:avLst/>
+          </a:prstGeom>
+        </p:spPr>
+        <p:txBody>
+          <a:bodyPr spcFirstLastPara="1" wrap="square" lIns="91425" tIns="91425" rIns="91425" bIns="91425" anchor="t" anchorCtr="0">
+            <a:noAutofit/>
+          </a:bodyPr>
+          <a:lstStyle/>
+          <a:p>
+            <a:pPr marL="0" lvl="0" indent="0" algn="l" rtl="0">
+              <a:spcBef>
+                <a:spcPts val="0"/>
+              </a:spcBef>
+              <a:spcAft>
+                <a:spcPts val="0"/>
+              </a:spcAft>
+              <a:buNone/>
+            </a:pPr>
+            <a:endParaRPr/>
+          </a:p>
+        </p:txBody>
+      </p:sp>
+    </p:spTree>
+    <p:extLst>
+      <p:ext uri="{BB962C8B-B14F-4D97-AF65-F5344CB8AC3E}">
+        <p14:creationId xmlns:p14="http://schemas.microsoft.com/office/powerpoint/2010/main" val="3063830158"/>
+      </p:ext>
+    </p:extLst>
   </p:cSld>
   <p:clrMapOvr>
     <a:masterClrMapping/>
@@ -12640,7 +12750,7 @@
         </p:nvGraphicFramePr>
         <p:xfrm>
           <a:off x="940844" y="1875291"/>
-          <a:ext cx="3755697" cy="2501862"/>
+          <a:ext cx="3755697" cy="2503005"/>
         </p:xfrm>
         <a:graphic>
           <a:graphicData uri="http://schemas.openxmlformats.org/drawingml/2006/table">
@@ -20338,7 +20448,7 @@
         <p:spPr>
           <a:xfrm>
             <a:off x="796200" y="109800"/>
-            <a:ext cx="1066200" cy="277800"/>
+            <a:ext cx="1376334" cy="277800"/>
           </a:xfrm>
           <a:prstGeom prst="rect">
             <a:avLst/>
@@ -20373,7 +20483,7 @@
                 <a:cs typeface="Oswald"/>
                 <a:sym typeface="Oswald"/>
               </a:rPr>
-              <a:t>&lt;Angular&gt;</a:t>
+              <a:t>Angular – Was ist das?</a:t>
             </a:r>
             <a:endParaRPr sz="1000" dirty="0">
               <a:solidFill>
@@ -22848,7 +22958,7 @@
         <p:spPr>
           <a:xfrm>
             <a:off x="720000" y="1188900"/>
-            <a:ext cx="3636463" cy="3380100"/>
+            <a:ext cx="3636463" cy="3039366"/>
           </a:xfrm>
           <a:prstGeom prst="rect">
             <a:avLst/>
@@ -23159,8 +23269,8 @@
         </p:nvSpPr>
         <p:spPr>
           <a:xfrm>
-            <a:off x="4356463" y="1195611"/>
-            <a:ext cx="4067539" cy="3380100"/>
+            <a:off x="4356463" y="1195610"/>
+            <a:ext cx="4067539" cy="3407889"/>
           </a:xfrm>
           <a:prstGeom prst="rect">
             <a:avLst/>
@@ -23506,6 +23616,17 @@
               <a:t>Struktur</a:t>
             </a:r>
           </a:p>
+          <a:p>
+            <a:pPr marL="553721" indent="-342900">
+              <a:buSzPct val="100000"/>
+              <a:buFont typeface="+mj-lt"/>
+              <a:buAutoNum type="arabicPeriod" startAt="8"/>
+            </a:pPr>
+            <a:r>
+              <a:rPr lang="en-US" sz="2000" dirty="0"/>
+              <a:t>Demo</a:t>
+            </a:r>
+          </a:p>
         </p:txBody>
       </p:sp>
     </p:spTree>
@@ -23558,7 +23679,7 @@
         <p:spPr>
           <a:xfrm>
             <a:off x="796200" y="109800"/>
-            <a:ext cx="1066200" cy="277800"/>
+            <a:ext cx="2317432" cy="277800"/>
           </a:xfrm>
           <a:prstGeom prst="rect">
             <a:avLst/>
@@ -23593,7 +23714,7 @@
                 <a:cs typeface="Oswald"/>
                 <a:sym typeface="Oswald"/>
               </a:rPr>
-              <a:t>&lt;Material&gt;</a:t>
+              <a:t>Material – Was macht das eigentlich?</a:t>
             </a:r>
             <a:endParaRPr sz="1000" dirty="0">
               <a:solidFill>
@@ -25365,8 +25486,8 @@
         </p:nvSpPr>
         <p:spPr>
           <a:xfrm>
-            <a:off x="796200" y="109800"/>
-            <a:ext cx="1066200" cy="277800"/>
+            <a:off x="796199" y="109800"/>
+            <a:ext cx="1423055" cy="277800"/>
           </a:xfrm>
           <a:prstGeom prst="rect">
             <a:avLst/>
@@ -25401,7 +25522,7 @@
                 <a:cs typeface="Oswald"/>
                 <a:sym typeface="Oswald"/>
               </a:rPr>
-              <a:t>&lt;Struktur&gt;</a:t>
+              <a:t>Struktur - Aufbau</a:t>
             </a:r>
             <a:endParaRPr sz="1000" dirty="0">
               <a:solidFill>
@@ -26118,6 +26239,748 @@
       </p:transition>
     </mc:Choice>
     <mc:Fallback xmlns="">
+      <p:transition spd="med">
+        <p:fade/>
+      </p:transition>
+    </mc:Fallback>
+  </mc:AlternateContent>
+</p:sld>
+</file>
+
+<file path=ppt/slides/slide23.xml><?xml version="1.0" encoding="utf-8"?>
+<p:sld xmlns:a="http://schemas.openxmlformats.org/drawingml/2006/main" xmlns:r="http://schemas.openxmlformats.org/officeDocument/2006/relationships" xmlns:p="http://schemas.openxmlformats.org/presentationml/2006/main">
+  <p:cSld>
+    <p:spTree>
+      <p:nvGrpSpPr>
+        <p:cNvPr id="1" name="Shape 463"/>
+        <p:cNvGrpSpPr/>
+        <p:nvPr/>
+      </p:nvGrpSpPr>
+      <p:grpSpPr>
+        <a:xfrm>
+          <a:off x="0" y="0"/>
+          <a:ext cx="0" cy="0"/>
+          <a:chOff x="0" y="0"/>
+          <a:chExt cx="0" cy="0"/>
+        </a:xfrm>
+      </p:grpSpPr>
+      <p:grpSp>
+        <p:nvGrpSpPr>
+          <p:cNvPr id="465" name="Google Shape;465;p32"/>
+          <p:cNvGrpSpPr/>
+          <p:nvPr/>
+        </p:nvGrpSpPr>
+        <p:grpSpPr>
+          <a:xfrm>
+            <a:off x="299286" y="189025"/>
+            <a:ext cx="133205" cy="119344"/>
+            <a:chOff x="222150" y="185025"/>
+            <a:chExt cx="170100" cy="152400"/>
+          </a:xfrm>
+        </p:grpSpPr>
+        <p:cxnSp>
+          <p:nvCxnSpPr>
+            <p:cNvPr id="466" name="Google Shape;466;p32"/>
+            <p:cNvCxnSpPr/>
+            <p:nvPr/>
+          </p:nvCxnSpPr>
+          <p:spPr>
+            <a:xfrm>
+              <a:off x="222150" y="185025"/>
+              <a:ext cx="170100" cy="0"/>
+            </a:xfrm>
+            <a:prstGeom prst="straightConnector1">
+              <a:avLst/>
+            </a:prstGeom>
+            <a:noFill/>
+            <a:ln w="9525" cap="rnd" cmpd="sng">
+              <a:solidFill>
+                <a:schemeClr val="dk2"/>
+              </a:solidFill>
+              <a:prstDash val="solid"/>
+              <a:round/>
+              <a:headEnd type="none" w="med" len="med"/>
+              <a:tailEnd type="none" w="med" len="med"/>
+            </a:ln>
+          </p:spPr>
+        </p:cxnSp>
+        <p:cxnSp>
+          <p:nvCxnSpPr>
+            <p:cNvPr id="467" name="Google Shape;467;p32"/>
+            <p:cNvCxnSpPr/>
+            <p:nvPr/>
+          </p:nvCxnSpPr>
+          <p:spPr>
+            <a:xfrm>
+              <a:off x="222150" y="337425"/>
+              <a:ext cx="170100" cy="0"/>
+            </a:xfrm>
+            <a:prstGeom prst="straightConnector1">
+              <a:avLst/>
+            </a:prstGeom>
+            <a:noFill/>
+            <a:ln w="9525" cap="rnd" cmpd="sng">
+              <a:solidFill>
+                <a:schemeClr val="dk2"/>
+              </a:solidFill>
+              <a:prstDash val="solid"/>
+              <a:round/>
+              <a:headEnd type="none" w="med" len="med"/>
+              <a:tailEnd type="none" w="med" len="med"/>
+            </a:ln>
+          </p:spPr>
+        </p:cxnSp>
+        <p:cxnSp>
+          <p:nvCxnSpPr>
+            <p:cNvPr id="468" name="Google Shape;468;p32"/>
+            <p:cNvCxnSpPr/>
+            <p:nvPr/>
+          </p:nvCxnSpPr>
+          <p:spPr>
+            <a:xfrm>
+              <a:off x="222150" y="261225"/>
+              <a:ext cx="170100" cy="0"/>
+            </a:xfrm>
+            <a:prstGeom prst="straightConnector1">
+              <a:avLst/>
+            </a:prstGeom>
+            <a:noFill/>
+            <a:ln w="9525" cap="rnd" cmpd="sng">
+              <a:solidFill>
+                <a:schemeClr val="dk2"/>
+              </a:solidFill>
+              <a:prstDash val="solid"/>
+              <a:round/>
+              <a:headEnd type="none" w="med" len="med"/>
+              <a:tailEnd type="none" w="med" len="med"/>
+            </a:ln>
+          </p:spPr>
+        </p:cxnSp>
+      </p:grpSp>
+      <p:grpSp>
+        <p:nvGrpSpPr>
+          <p:cNvPr id="469" name="Google Shape;469;p32"/>
+          <p:cNvGrpSpPr/>
+          <p:nvPr/>
+        </p:nvGrpSpPr>
+        <p:grpSpPr>
+          <a:xfrm>
+            <a:off x="286625" y="3999999"/>
+            <a:ext cx="145867" cy="958251"/>
+            <a:chOff x="286625" y="3923799"/>
+            <a:chExt cx="145867" cy="958251"/>
+          </a:xfrm>
+        </p:grpSpPr>
+        <p:sp>
+          <p:nvSpPr>
+            <p:cNvPr id="470" name="Google Shape;470;p32"/>
+            <p:cNvSpPr/>
+            <p:nvPr/>
+          </p:nvSpPr>
+          <p:spPr>
+            <a:xfrm>
+              <a:off x="299292" y="4755150"/>
+              <a:ext cx="133200" cy="126900"/>
+            </a:xfrm>
+            <a:prstGeom prst="star5">
+              <a:avLst>
+                <a:gd name="adj" fmla="val 25435"/>
+                <a:gd name="hf" fmla="val 105146"/>
+                <a:gd name="vf" fmla="val 110557"/>
+              </a:avLst>
+            </a:prstGeom>
+            <a:noFill/>
+            <a:ln w="9525" cap="flat" cmpd="sng">
+              <a:solidFill>
+                <a:schemeClr val="dk2"/>
+              </a:solidFill>
+              <a:prstDash val="solid"/>
+              <a:round/>
+              <a:headEnd type="none" w="sm" len="sm"/>
+              <a:tailEnd type="none" w="sm" len="sm"/>
+            </a:ln>
+          </p:spPr>
+          <p:txBody>
+            <a:bodyPr spcFirstLastPara="1" wrap="square" lIns="91425" tIns="91425" rIns="91425" bIns="91425" anchor="ctr" anchorCtr="0">
+              <a:noAutofit/>
+            </a:bodyPr>
+            <a:lstStyle/>
+            <a:p>
+              <a:pPr marL="0" lvl="0" indent="0" algn="l" rtl="0">
+                <a:spcBef>
+                  <a:spcPts val="0"/>
+                </a:spcBef>
+                <a:spcAft>
+                  <a:spcPts val="0"/>
+                </a:spcAft>
+                <a:buNone/>
+              </a:pPr>
+              <a:endParaRPr/>
+            </a:p>
+          </p:txBody>
+        </p:sp>
+        <p:grpSp>
+          <p:nvGrpSpPr>
+            <p:cNvPr id="471" name="Google Shape;471;p32"/>
+            <p:cNvGrpSpPr/>
+            <p:nvPr/>
+          </p:nvGrpSpPr>
+          <p:grpSpPr>
+            <a:xfrm>
+              <a:off x="298112" y="4342643"/>
+              <a:ext cx="110182" cy="126862"/>
+              <a:chOff x="281100" y="2027800"/>
+              <a:chExt cx="140700" cy="162000"/>
+            </a:xfrm>
+          </p:grpSpPr>
+          <p:sp>
+            <p:nvSpPr>
+              <p:cNvPr id="472" name="Google Shape;472;p32"/>
+              <p:cNvSpPr/>
+              <p:nvPr/>
+            </p:nvSpPr>
+            <p:spPr>
+              <a:xfrm>
+                <a:off x="281100" y="2027800"/>
+                <a:ext cx="140700" cy="162000"/>
+              </a:xfrm>
+              <a:prstGeom prst="roundRect">
+                <a:avLst>
+                  <a:gd name="adj" fmla="val 16667"/>
+                </a:avLst>
+              </a:prstGeom>
+              <a:noFill/>
+              <a:ln w="9525" cap="flat" cmpd="sng">
+                <a:solidFill>
+                  <a:schemeClr val="dk2"/>
+                </a:solidFill>
+                <a:prstDash val="solid"/>
+                <a:round/>
+                <a:headEnd type="none" w="sm" len="sm"/>
+                <a:tailEnd type="none" w="sm" len="sm"/>
+              </a:ln>
+            </p:spPr>
+            <p:txBody>
+              <a:bodyPr spcFirstLastPara="1" wrap="square" lIns="91425" tIns="91425" rIns="91425" bIns="91425" anchor="ctr" anchorCtr="0">
+                <a:noAutofit/>
+              </a:bodyPr>
+              <a:lstStyle/>
+              <a:p>
+                <a:pPr marL="0" lvl="0" indent="0" algn="l" rtl="0">
+                  <a:spcBef>
+                    <a:spcPts val="0"/>
+                  </a:spcBef>
+                  <a:spcAft>
+                    <a:spcPts val="0"/>
+                  </a:spcAft>
+                  <a:buNone/>
+                </a:pPr>
+                <a:endParaRPr/>
+              </a:p>
+            </p:txBody>
+          </p:sp>
+          <p:grpSp>
+            <p:nvGrpSpPr>
+              <p:cNvPr id="473" name="Google Shape;473;p32"/>
+              <p:cNvGrpSpPr/>
+              <p:nvPr/>
+            </p:nvGrpSpPr>
+            <p:grpSpPr>
+              <a:xfrm>
+                <a:off x="308875" y="2088450"/>
+                <a:ext cx="85200" cy="40700"/>
+                <a:chOff x="308875" y="2087000"/>
+                <a:chExt cx="85200" cy="40700"/>
+              </a:xfrm>
+            </p:grpSpPr>
+            <p:cxnSp>
+              <p:nvCxnSpPr>
+                <p:cNvPr id="474" name="Google Shape;474;p32"/>
+                <p:cNvCxnSpPr/>
+                <p:nvPr/>
+              </p:nvCxnSpPr>
+              <p:spPr>
+                <a:xfrm>
+                  <a:off x="308875" y="2087000"/>
+                  <a:ext cx="85200" cy="0"/>
+                </a:xfrm>
+                <a:prstGeom prst="straightConnector1">
+                  <a:avLst/>
+                </a:prstGeom>
+                <a:noFill/>
+                <a:ln w="9525" cap="flat" cmpd="sng">
+                  <a:solidFill>
+                    <a:schemeClr val="dk2"/>
+                  </a:solidFill>
+                  <a:prstDash val="solid"/>
+                  <a:round/>
+                  <a:headEnd type="none" w="med" len="med"/>
+                  <a:tailEnd type="none" w="med" len="med"/>
+                </a:ln>
+              </p:spPr>
+            </p:cxnSp>
+            <p:cxnSp>
+              <p:nvCxnSpPr>
+                <p:cNvPr id="475" name="Google Shape;475;p32"/>
+                <p:cNvCxnSpPr/>
+                <p:nvPr/>
+              </p:nvCxnSpPr>
+              <p:spPr>
+                <a:xfrm>
+                  <a:off x="308875" y="2127700"/>
+                  <a:ext cx="85200" cy="0"/>
+                </a:xfrm>
+                <a:prstGeom prst="straightConnector1">
+                  <a:avLst/>
+                </a:prstGeom>
+                <a:noFill/>
+                <a:ln w="9525" cap="flat" cmpd="sng">
+                  <a:solidFill>
+                    <a:schemeClr val="dk2"/>
+                  </a:solidFill>
+                  <a:prstDash val="solid"/>
+                  <a:round/>
+                  <a:headEnd type="none" w="med" len="med"/>
+                  <a:tailEnd type="none" w="med" len="med"/>
+                </a:ln>
+              </p:spPr>
+            </p:cxnSp>
+          </p:grpSp>
+        </p:grpSp>
+        <p:grpSp>
+          <p:nvGrpSpPr>
+            <p:cNvPr id="476" name="Google Shape;476;p32"/>
+            <p:cNvGrpSpPr/>
+            <p:nvPr/>
+          </p:nvGrpSpPr>
+          <p:grpSpPr>
+            <a:xfrm>
+              <a:off x="286625" y="3923799"/>
+              <a:ext cx="133200" cy="133200"/>
+              <a:chOff x="286625" y="3648899"/>
+              <a:chExt cx="133200" cy="133200"/>
+            </a:xfrm>
+          </p:grpSpPr>
+          <p:sp>
+            <p:nvSpPr>
+              <p:cNvPr id="477" name="Google Shape;477;p32"/>
+              <p:cNvSpPr/>
+              <p:nvPr/>
+            </p:nvSpPr>
+            <p:spPr>
+              <a:xfrm>
+                <a:off x="286625" y="3648899"/>
+                <a:ext cx="133200" cy="133200"/>
+              </a:xfrm>
+              <a:prstGeom prst="ellipse">
+                <a:avLst/>
+              </a:prstGeom>
+              <a:noFill/>
+              <a:ln w="9525" cap="flat" cmpd="sng">
+                <a:solidFill>
+                  <a:schemeClr val="dk2"/>
+                </a:solidFill>
+                <a:prstDash val="solid"/>
+                <a:round/>
+                <a:headEnd type="none" w="sm" len="sm"/>
+                <a:tailEnd type="none" w="sm" len="sm"/>
+              </a:ln>
+            </p:spPr>
+            <p:txBody>
+              <a:bodyPr spcFirstLastPara="1" wrap="square" lIns="91425" tIns="91425" rIns="91425" bIns="91425" anchor="ctr" anchorCtr="0">
+                <a:noAutofit/>
+              </a:bodyPr>
+              <a:lstStyle/>
+              <a:p>
+                <a:pPr marL="0" lvl="0" indent="0" algn="l" rtl="0">
+                  <a:spcBef>
+                    <a:spcPts val="0"/>
+                  </a:spcBef>
+                  <a:spcAft>
+                    <a:spcPts val="0"/>
+                  </a:spcAft>
+                  <a:buNone/>
+                </a:pPr>
+                <a:endParaRPr/>
+              </a:p>
+            </p:txBody>
+          </p:sp>
+          <p:sp>
+            <p:nvSpPr>
+              <p:cNvPr id="478" name="Google Shape;478;p32"/>
+              <p:cNvSpPr/>
+              <p:nvPr/>
+            </p:nvSpPr>
+            <p:spPr>
+              <a:xfrm>
+                <a:off x="319164" y="3681436"/>
+                <a:ext cx="68100" cy="68100"/>
+              </a:xfrm>
+              <a:prstGeom prst="ellipse">
+                <a:avLst/>
+              </a:prstGeom>
+              <a:noFill/>
+              <a:ln w="9525" cap="flat" cmpd="sng">
+                <a:solidFill>
+                  <a:schemeClr val="dk2"/>
+                </a:solidFill>
+                <a:prstDash val="solid"/>
+                <a:round/>
+                <a:headEnd type="none" w="sm" len="sm"/>
+                <a:tailEnd type="none" w="sm" len="sm"/>
+              </a:ln>
+            </p:spPr>
+            <p:txBody>
+              <a:bodyPr spcFirstLastPara="1" wrap="square" lIns="91425" tIns="91425" rIns="91425" bIns="91425" anchor="ctr" anchorCtr="0">
+                <a:noAutofit/>
+              </a:bodyPr>
+              <a:lstStyle/>
+              <a:p>
+                <a:pPr marL="0" lvl="0" indent="0" algn="l" rtl="0">
+                  <a:spcBef>
+                    <a:spcPts val="0"/>
+                  </a:spcBef>
+                  <a:spcAft>
+                    <a:spcPts val="0"/>
+                  </a:spcAft>
+                  <a:buNone/>
+                </a:pPr>
+                <a:endParaRPr/>
+              </a:p>
+            </p:txBody>
+          </p:sp>
+        </p:grpSp>
+      </p:grpSp>
+      <p:sp>
+        <p:nvSpPr>
+          <p:cNvPr id="481" name="Google Shape;481;p32"/>
+          <p:cNvSpPr txBox="1">
+            <a:spLocks noGrp="1"/>
+          </p:cNvSpPr>
+          <p:nvPr>
+            <p:ph type="body" idx="1"/>
+          </p:nvPr>
+        </p:nvSpPr>
+        <p:spPr>
+          <a:xfrm>
+            <a:off x="719999" y="1188900"/>
+            <a:ext cx="7703999" cy="3414600"/>
+          </a:xfrm>
+          <a:prstGeom prst="rect">
+            <a:avLst/>
+          </a:prstGeom>
+        </p:spPr>
+        <p:txBody>
+          <a:bodyPr spcFirstLastPara="1" wrap="square" lIns="91425" tIns="91425" rIns="91425" bIns="91425" numCol="1" anchor="ctr" anchorCtr="0">
+            <a:noAutofit/>
+          </a:bodyPr>
+          <a:lstStyle/>
+          <a:p>
+            <a:pPr marL="668021" lvl="0" indent="-457200" algn="l" rtl="0">
+              <a:spcBef>
+                <a:spcPts val="1000"/>
+              </a:spcBef>
+              <a:spcAft>
+                <a:spcPts val="0"/>
+              </a:spcAft>
+              <a:buSzPct val="100000"/>
+            </a:pPr>
+            <a:r>
+              <a:rPr lang="de-DE" sz="2000" dirty="0" err="1"/>
+              <a:t>Regi</a:t>
+            </a:r>
+            <a:r>
+              <a:rPr lang="de-DE" sz="2000" dirty="0"/>
+              <a:t> + </a:t>
+            </a:r>
+            <a:r>
+              <a:rPr lang="de-DE" sz="2000" dirty="0" err="1"/>
+              <a:t>Einloggi</a:t>
+            </a:r>
+            <a:endParaRPr lang="de-DE" sz="2000" dirty="0"/>
+          </a:p>
+          <a:p>
+            <a:pPr marL="668021" lvl="0" indent="-457200" algn="l" rtl="0">
+              <a:spcBef>
+                <a:spcPts val="1000"/>
+              </a:spcBef>
+              <a:spcAft>
+                <a:spcPts val="0"/>
+              </a:spcAft>
+              <a:buSzPct val="100000"/>
+            </a:pPr>
+            <a:r>
+              <a:rPr lang="de-DE" sz="2000" dirty="0"/>
+              <a:t>Sportart anlegen</a:t>
+            </a:r>
+          </a:p>
+          <a:p>
+            <a:pPr marL="668021" lvl="0" indent="-457200" algn="l" rtl="0">
+              <a:spcBef>
+                <a:spcPts val="1000"/>
+              </a:spcBef>
+              <a:spcAft>
+                <a:spcPts val="0"/>
+              </a:spcAft>
+              <a:buSzPct val="100000"/>
+            </a:pPr>
+            <a:r>
+              <a:rPr lang="de-DE" sz="2000" dirty="0"/>
+              <a:t>Mannschaft anlegen</a:t>
+            </a:r>
+          </a:p>
+          <a:p>
+            <a:pPr marL="668021" lvl="0" indent="-457200" algn="l" rtl="0">
+              <a:spcBef>
+                <a:spcPts val="1000"/>
+              </a:spcBef>
+              <a:spcAft>
+                <a:spcPts val="0"/>
+              </a:spcAft>
+              <a:buSzPct val="100000"/>
+            </a:pPr>
+            <a:r>
+              <a:rPr lang="de-DE" sz="2000" dirty="0"/>
+              <a:t>Member anlegen</a:t>
+            </a:r>
+          </a:p>
+          <a:p>
+            <a:pPr marL="668021" lvl="0" indent="-457200" algn="l" rtl="0">
+              <a:spcBef>
+                <a:spcPts val="1000"/>
+              </a:spcBef>
+              <a:spcAft>
+                <a:spcPts val="0"/>
+              </a:spcAft>
+              <a:buSzPct val="100000"/>
+            </a:pPr>
+            <a:r>
+              <a:rPr lang="de-DE" sz="2000" dirty="0"/>
+              <a:t>Member editieren</a:t>
+            </a:r>
+          </a:p>
+          <a:p>
+            <a:pPr marL="668021" lvl="0" indent="-457200" algn="l" rtl="0">
+              <a:spcBef>
+                <a:spcPts val="1000"/>
+              </a:spcBef>
+              <a:spcAft>
+                <a:spcPts val="0"/>
+              </a:spcAft>
+              <a:buSzPct val="100000"/>
+            </a:pPr>
+            <a:r>
+              <a:rPr lang="de-DE" sz="2000" dirty="0"/>
+              <a:t>Member löschen</a:t>
+            </a:r>
+          </a:p>
+        </p:txBody>
+      </p:sp>
+      <p:sp>
+        <p:nvSpPr>
+          <p:cNvPr id="482" name="Google Shape;482;p32">
+            <a:hlinkClick r:id="" action="ppaction://noaction"/>
+          </p:cNvPr>
+          <p:cNvSpPr/>
+          <p:nvPr/>
+        </p:nvSpPr>
+        <p:spPr>
+          <a:xfrm>
+            <a:off x="282938" y="169500"/>
+            <a:ext cx="165900" cy="158400"/>
+          </a:xfrm>
+          <a:prstGeom prst="rect">
+            <a:avLst/>
+          </a:prstGeom>
+          <a:noFill/>
+          <a:ln>
+            <a:noFill/>
+          </a:ln>
+        </p:spPr>
+        <p:txBody>
+          <a:bodyPr spcFirstLastPara="1" wrap="square" lIns="91425" tIns="91425" rIns="91425" bIns="91425" anchor="ctr" anchorCtr="0">
+            <a:noAutofit/>
+          </a:bodyPr>
+          <a:lstStyle/>
+          <a:p>
+            <a:pPr marL="0" lvl="0" indent="0" algn="l" rtl="0">
+              <a:spcBef>
+                <a:spcPts val="0"/>
+              </a:spcBef>
+              <a:spcAft>
+                <a:spcPts val="0"/>
+              </a:spcAft>
+              <a:buNone/>
+            </a:pPr>
+            <a:endParaRPr/>
+          </a:p>
+        </p:txBody>
+      </p:sp>
+      <p:sp>
+        <p:nvSpPr>
+          <p:cNvPr id="483" name="Google Shape;483;p32">
+            <a:hlinkClick r:id="" action="ppaction://noaction"/>
+          </p:cNvPr>
+          <p:cNvSpPr/>
+          <p:nvPr/>
+        </p:nvSpPr>
+        <p:spPr>
+          <a:xfrm>
+            <a:off x="276600" y="4399925"/>
+            <a:ext cx="165900" cy="158400"/>
+          </a:xfrm>
+          <a:prstGeom prst="rect">
+            <a:avLst/>
+          </a:prstGeom>
+          <a:noFill/>
+          <a:ln>
+            <a:noFill/>
+          </a:ln>
+        </p:spPr>
+        <p:txBody>
+          <a:bodyPr spcFirstLastPara="1" wrap="square" lIns="91425" tIns="91425" rIns="91425" bIns="91425" anchor="ctr" anchorCtr="0">
+            <a:noAutofit/>
+          </a:bodyPr>
+          <a:lstStyle/>
+          <a:p>
+            <a:pPr marL="0" lvl="0" indent="0" algn="l" rtl="0">
+              <a:spcBef>
+                <a:spcPts val="0"/>
+              </a:spcBef>
+              <a:spcAft>
+                <a:spcPts val="0"/>
+              </a:spcAft>
+              <a:buNone/>
+            </a:pPr>
+            <a:endParaRPr/>
+          </a:p>
+        </p:txBody>
+      </p:sp>
+      <p:sp>
+        <p:nvSpPr>
+          <p:cNvPr id="484" name="Google Shape;484;p32">
+            <a:hlinkClick r:id="" action="ppaction://noaction"/>
+          </p:cNvPr>
+          <p:cNvSpPr/>
+          <p:nvPr/>
+        </p:nvSpPr>
+        <p:spPr>
+          <a:xfrm>
+            <a:off x="276600" y="3992675"/>
+            <a:ext cx="165900" cy="158400"/>
+          </a:xfrm>
+          <a:prstGeom prst="rect">
+            <a:avLst/>
+          </a:prstGeom>
+          <a:noFill/>
+          <a:ln>
+            <a:noFill/>
+          </a:ln>
+        </p:spPr>
+        <p:txBody>
+          <a:bodyPr spcFirstLastPara="1" wrap="square" lIns="91425" tIns="91425" rIns="91425" bIns="91425" anchor="ctr" anchorCtr="0">
+            <a:noAutofit/>
+          </a:bodyPr>
+          <a:lstStyle/>
+          <a:p>
+            <a:pPr marL="0" lvl="0" indent="0" algn="l" rtl="0">
+              <a:spcBef>
+                <a:spcPts val="0"/>
+              </a:spcBef>
+              <a:spcAft>
+                <a:spcPts val="0"/>
+              </a:spcAft>
+              <a:buNone/>
+            </a:pPr>
+            <a:endParaRPr/>
+          </a:p>
+        </p:txBody>
+      </p:sp>
+      <p:sp>
+        <p:nvSpPr>
+          <p:cNvPr id="485" name="Google Shape;485;p32">
+            <a:hlinkClick r:id="" action="ppaction://noaction"/>
+          </p:cNvPr>
+          <p:cNvSpPr/>
+          <p:nvPr/>
+        </p:nvSpPr>
+        <p:spPr>
+          <a:xfrm>
+            <a:off x="276600" y="4821475"/>
+            <a:ext cx="165900" cy="158400"/>
+          </a:xfrm>
+          <a:prstGeom prst="rect">
+            <a:avLst/>
+          </a:prstGeom>
+          <a:noFill/>
+          <a:ln>
+            <a:noFill/>
+          </a:ln>
+        </p:spPr>
+        <p:txBody>
+          <a:bodyPr spcFirstLastPara="1" wrap="square" lIns="91425" tIns="91425" rIns="91425" bIns="91425" anchor="ctr" anchorCtr="0">
+            <a:noAutofit/>
+          </a:bodyPr>
+          <a:lstStyle/>
+          <a:p>
+            <a:pPr marL="0" lvl="0" indent="0" algn="l" rtl="0">
+              <a:spcBef>
+                <a:spcPts val="0"/>
+              </a:spcBef>
+              <a:spcAft>
+                <a:spcPts val="0"/>
+              </a:spcAft>
+              <a:buNone/>
+            </a:pPr>
+            <a:endParaRPr/>
+          </a:p>
+        </p:txBody>
+      </p:sp>
+      <p:sp>
+        <p:nvSpPr>
+          <p:cNvPr id="3" name="Titel 2">
+            <a:extLst>
+              <a:ext uri="{FF2B5EF4-FFF2-40B4-BE49-F238E27FC236}">
+                <a16:creationId xmlns:a16="http://schemas.microsoft.com/office/drawing/2014/main" id="{E1DE550F-FBAB-172E-E5DE-16A8A72236CD}"/>
+              </a:ext>
+            </a:extLst>
+          </p:cNvPr>
+          <p:cNvSpPr>
+            <a:spLocks noGrp="1"/>
+          </p:cNvSpPr>
+          <p:nvPr>
+            <p:ph type="title"/>
+          </p:nvPr>
+        </p:nvSpPr>
+        <p:spPr/>
+        <p:txBody>
+          <a:bodyPr/>
+          <a:lstStyle/>
+          <a:p>
+            <a:r>
+              <a:rPr lang="de-DE" dirty="0"/>
+              <a:t>Demo</a:t>
+            </a:r>
+          </a:p>
+        </p:txBody>
+      </p:sp>
+    </p:spTree>
+    <p:extLst>
+      <p:ext uri="{BB962C8B-B14F-4D97-AF65-F5344CB8AC3E}">
+        <p14:creationId xmlns:p14="http://schemas.microsoft.com/office/powerpoint/2010/main" val="2095525837"/>
+      </p:ext>
+    </p:extLst>
+  </p:cSld>
+  <p:clrMapOvr>
+    <a:masterClrMapping/>
+  </p:clrMapOvr>
+  <mc:AlternateContent xmlns:mc="http://schemas.openxmlformats.org/markup-compatibility/2006">
+    <mc:Choice xmlns:p14="http://schemas.microsoft.com/office/powerpoint/2010/main" Requires="p14">
+      <p:transition spd="med" p14:dur="700">
+        <p:fade/>
+      </p:transition>
+    </mc:Choice>
+    <mc:Fallback>
       <p:transition spd="med">
         <p:fade/>
       </p:transition>

</xml_diff>